<commit_message>
Implement A* Pathfinding Functionality
A* Pathfinding added to find the path between start and finish nodes
the path is then exported as a .csv file of UTM coordinates of the
path. The path has been implemented to only move in 4-directions as
the data is on a grid for now. The heuristic selected to estimate the
cost to the goal is the Manhattan Distance. The A* algorithm is
configured to look for the shortest, smoothest path. This is achieved
by taking into account the distance cost of each movement but also
including the difference in depth between each node.

To allow for the implementation of the A* algorithm a custom implementation
of a priority queue has been added in the PriorityQueue Class. This inserts
the items in order of F_Cost. The implementation maintains the FIFO ordering
of nodes where nodes are equal.
</commit_message>
<xml_diff>
--- a/Data/DataNotes.pptx
+++ b/Data/DataNotes.pptx
@@ -8,6 +8,8 @@
     <p:sldId id="256" r:id="rId2"/>
     <p:sldId id="257" r:id="rId3"/>
     <p:sldId id="258" r:id="rId4"/>
+    <p:sldId id="259" r:id="rId5"/>
+    <p:sldId id="260" r:id="rId6"/>
   </p:sldIdLst>
   <p:sldSz cx="12192000" cy="6858000"/>
   <p:notesSz cx="6858000" cy="9144000"/>
@@ -113,8 +115,8 @@
 <pc:chgInfo xmlns:a="http://schemas.openxmlformats.org/drawingml/2006/main" xmlns:r="http://schemas.openxmlformats.org/officeDocument/2006/relationships" xmlns:ac="http://schemas.microsoft.com/office/drawing/2013/main/command" xmlns:pc="http://schemas.microsoft.com/office/powerpoint/2013/main/command">
   <pc:docChgLst>
     <pc:chgData name="JOSEPH LEE" userId="a44f2c12-3c6b-4dcf-9734-cf21ba793b98" providerId="ADAL" clId="{EA46388E-06E0-461B-AC3B-0A927C07D937}"/>
-    <pc:docChg chg="custSel modSld">
-      <pc:chgData name="JOSEPH LEE" userId="a44f2c12-3c6b-4dcf-9734-cf21ba793b98" providerId="ADAL" clId="{EA46388E-06E0-461B-AC3B-0A927C07D937}" dt="2020-12-30T09:50:52.918" v="5" actId="478"/>
+    <pc:docChg chg="custSel addSld modSld">
+      <pc:chgData name="JOSEPH LEE" userId="a44f2c12-3c6b-4dcf-9734-cf21ba793b98" providerId="ADAL" clId="{EA46388E-06E0-461B-AC3B-0A927C07D937}" dt="2020-12-30T21:51:04.378" v="11" actId="22"/>
       <pc:docMkLst>
         <pc:docMk/>
       </pc:docMkLst>
@@ -172,6 +174,52 @@
             <ac:cxnSpMk id="11" creationId="{A585F349-7EFE-44FC-A176-1B91C855B597}"/>
           </ac:cxnSpMkLst>
         </pc:cxnChg>
+      </pc:sldChg>
+      <pc:sldChg chg="addSp delSp add mod">
+        <pc:chgData name="JOSEPH LEE" userId="a44f2c12-3c6b-4dcf-9734-cf21ba793b98" providerId="ADAL" clId="{EA46388E-06E0-461B-AC3B-0A927C07D937}" dt="2020-12-30T21:49:27.664" v="8" actId="22"/>
+        <pc:sldMkLst>
+          <pc:docMk/>
+          <pc:sldMk cId="1442594842" sldId="259"/>
+        </pc:sldMkLst>
+        <pc:picChg chg="del">
+          <ac:chgData name="JOSEPH LEE" userId="a44f2c12-3c6b-4dcf-9734-cf21ba793b98" providerId="ADAL" clId="{EA46388E-06E0-461B-AC3B-0A927C07D937}" dt="2020-12-30T21:49:23.884" v="7" actId="478"/>
+          <ac:picMkLst>
+            <pc:docMk/>
+            <pc:sldMk cId="1442594842" sldId="259"/>
+            <ac:picMk id="3" creationId="{C2B0C110-5798-40D5-8DF7-B4504FD6D7B8}"/>
+          </ac:picMkLst>
+        </pc:picChg>
+        <pc:picChg chg="add">
+          <ac:chgData name="JOSEPH LEE" userId="a44f2c12-3c6b-4dcf-9734-cf21ba793b98" providerId="ADAL" clId="{EA46388E-06E0-461B-AC3B-0A927C07D937}" dt="2020-12-30T21:49:27.664" v="8" actId="22"/>
+          <ac:picMkLst>
+            <pc:docMk/>
+            <pc:sldMk cId="1442594842" sldId="259"/>
+            <ac:picMk id="4" creationId="{87D8F82C-D503-4354-87EC-E23C9BBCB39D}"/>
+          </ac:picMkLst>
+        </pc:picChg>
+      </pc:sldChg>
+      <pc:sldChg chg="addSp delSp add mod">
+        <pc:chgData name="JOSEPH LEE" userId="a44f2c12-3c6b-4dcf-9734-cf21ba793b98" providerId="ADAL" clId="{EA46388E-06E0-461B-AC3B-0A927C07D937}" dt="2020-12-30T21:51:04.378" v="11" actId="22"/>
+        <pc:sldMkLst>
+          <pc:docMk/>
+          <pc:sldMk cId="2623758735" sldId="260"/>
+        </pc:sldMkLst>
+        <pc:picChg chg="add">
+          <ac:chgData name="JOSEPH LEE" userId="a44f2c12-3c6b-4dcf-9734-cf21ba793b98" providerId="ADAL" clId="{EA46388E-06E0-461B-AC3B-0A927C07D937}" dt="2020-12-30T21:51:04.378" v="11" actId="22"/>
+          <ac:picMkLst>
+            <pc:docMk/>
+            <pc:sldMk cId="2623758735" sldId="260"/>
+            <ac:picMk id="3" creationId="{7FBA4EE5-5ADD-4A75-82EC-0423EDA0B5A3}"/>
+          </ac:picMkLst>
+        </pc:picChg>
+        <pc:picChg chg="del">
+          <ac:chgData name="JOSEPH LEE" userId="a44f2c12-3c6b-4dcf-9734-cf21ba793b98" providerId="ADAL" clId="{EA46388E-06E0-461B-AC3B-0A927C07D937}" dt="2020-12-30T21:51:03.833" v="10" actId="478"/>
+          <ac:picMkLst>
+            <pc:docMk/>
+            <pc:sldMk cId="2623758735" sldId="260"/>
+            <ac:picMk id="4" creationId="{87D8F82C-D503-4354-87EC-E23C9BBCB39D}"/>
+          </ac:picMkLst>
+        </pc:picChg>
       </pc:sldChg>
     </pc:docChg>
   </pc:docChgLst>
@@ -3628,6 +3676,126 @@
 </p:sld>
 </file>
 
+<file path=ppt/slides/slide4.xml><?xml version="1.0" encoding="utf-8"?>
+<p:sld xmlns:a="http://schemas.openxmlformats.org/drawingml/2006/main" xmlns:r="http://schemas.openxmlformats.org/officeDocument/2006/relationships" xmlns:p="http://schemas.openxmlformats.org/presentationml/2006/main">
+  <p:cSld>
+    <p:spTree>
+      <p:nvGrpSpPr>
+        <p:cNvPr id="1" name=""/>
+        <p:cNvGrpSpPr/>
+        <p:nvPr/>
+      </p:nvGrpSpPr>
+      <p:grpSpPr>
+        <a:xfrm>
+          <a:off x="0" y="0"/>
+          <a:ext cx="0" cy="0"/>
+          <a:chOff x="0" y="0"/>
+          <a:chExt cx="0" cy="0"/>
+        </a:xfrm>
+      </p:grpSpPr>
+      <p:pic>
+        <p:nvPicPr>
+          <p:cNvPr id="4" name="Picture 3">
+            <a:extLst>
+              <a:ext uri="{FF2B5EF4-FFF2-40B4-BE49-F238E27FC236}">
+                <a16:creationId xmlns:a16="http://schemas.microsoft.com/office/drawing/2014/main" id="{87D8F82C-D503-4354-87EC-E23C9BBCB39D}"/>
+              </a:ext>
+            </a:extLst>
+          </p:cNvPr>
+          <p:cNvPicPr>
+            <a:picLocks noChangeAspect="1"/>
+          </p:cNvPicPr>
+          <p:nvPr/>
+        </p:nvPicPr>
+        <p:blipFill>
+          <a:blip r:embed="rId2"/>
+          <a:stretch>
+            <a:fillRect/>
+          </a:stretch>
+        </p:blipFill>
+        <p:spPr>
+          <a:xfrm>
+            <a:off x="3871912" y="2224087"/>
+            <a:ext cx="4448175" cy="2409825"/>
+          </a:xfrm>
+          <a:prstGeom prst="rect">
+            <a:avLst/>
+          </a:prstGeom>
+        </p:spPr>
+      </p:pic>
+    </p:spTree>
+    <p:extLst>
+      <p:ext uri="{BB962C8B-B14F-4D97-AF65-F5344CB8AC3E}">
+        <p14:creationId xmlns:p14="http://schemas.microsoft.com/office/powerpoint/2010/main" val="1442594842"/>
+      </p:ext>
+    </p:extLst>
+  </p:cSld>
+  <p:clrMapOvr>
+    <a:masterClrMapping/>
+  </p:clrMapOvr>
+</p:sld>
+</file>
+
+<file path=ppt/slides/slide5.xml><?xml version="1.0" encoding="utf-8"?>
+<p:sld xmlns:a="http://schemas.openxmlformats.org/drawingml/2006/main" xmlns:r="http://schemas.openxmlformats.org/officeDocument/2006/relationships" xmlns:p="http://schemas.openxmlformats.org/presentationml/2006/main">
+  <p:cSld>
+    <p:spTree>
+      <p:nvGrpSpPr>
+        <p:cNvPr id="1" name=""/>
+        <p:cNvGrpSpPr/>
+        <p:nvPr/>
+      </p:nvGrpSpPr>
+      <p:grpSpPr>
+        <a:xfrm>
+          <a:off x="0" y="0"/>
+          <a:ext cx="0" cy="0"/>
+          <a:chOff x="0" y="0"/>
+          <a:chExt cx="0" cy="0"/>
+        </a:xfrm>
+      </p:grpSpPr>
+      <p:pic>
+        <p:nvPicPr>
+          <p:cNvPr id="3" name="Picture 2">
+            <a:extLst>
+              <a:ext uri="{FF2B5EF4-FFF2-40B4-BE49-F238E27FC236}">
+                <a16:creationId xmlns:a16="http://schemas.microsoft.com/office/drawing/2014/main" id="{7FBA4EE5-5ADD-4A75-82EC-0423EDA0B5A3}"/>
+              </a:ext>
+            </a:extLst>
+          </p:cNvPr>
+          <p:cNvPicPr>
+            <a:picLocks noChangeAspect="1"/>
+          </p:cNvPicPr>
+          <p:nvPr/>
+        </p:nvPicPr>
+        <p:blipFill>
+          <a:blip r:embed="rId2"/>
+          <a:stretch>
+            <a:fillRect/>
+          </a:stretch>
+        </p:blipFill>
+        <p:spPr>
+          <a:xfrm>
+            <a:off x="3871912" y="2233612"/>
+            <a:ext cx="4448175" cy="2390775"/>
+          </a:xfrm>
+          <a:prstGeom prst="rect">
+            <a:avLst/>
+          </a:prstGeom>
+        </p:spPr>
+      </p:pic>
+    </p:spTree>
+    <p:extLst>
+      <p:ext uri="{BB962C8B-B14F-4D97-AF65-F5344CB8AC3E}">
+        <p14:creationId xmlns:p14="http://schemas.microsoft.com/office/powerpoint/2010/main" val="2623758735"/>
+      </p:ext>
+    </p:extLst>
+  </p:cSld>
+  <p:clrMapOvr>
+    <a:masterClrMapping/>
+  </p:clrMapOvr>
+</p:sld>
+</file>
+
 <file path=ppt/theme/theme1.xml><?xml version="1.0" encoding="utf-8"?>
 <a:theme xmlns:a="http://schemas.openxmlformats.org/drawingml/2006/main" name="Office Theme">
   <a:themeElements>

</xml_diff>

<commit_message>
Numerous Small Changes Full Working Test Code
Still not complete but very close, wanted to commit before trying
new datasets.
</commit_message>
<xml_diff>
--- a/Data/DataNotes.pptx
+++ b/Data/DataNotes.pptx
@@ -6,10 +6,12 @@
   </p:sldMasterIdLst>
   <p:sldIdLst>
     <p:sldId id="256" r:id="rId2"/>
-    <p:sldId id="257" r:id="rId3"/>
-    <p:sldId id="258" r:id="rId4"/>
-    <p:sldId id="259" r:id="rId5"/>
-    <p:sldId id="260" r:id="rId6"/>
+    <p:sldId id="262" r:id="rId3"/>
+    <p:sldId id="257" r:id="rId4"/>
+    <p:sldId id="258" r:id="rId5"/>
+    <p:sldId id="259" r:id="rId6"/>
+    <p:sldId id="260" r:id="rId7"/>
+    <p:sldId id="261" r:id="rId8"/>
   </p:sldIdLst>
   <p:sldSz cx="12192000" cy="6858000"/>
   <p:notesSz cx="6858000" cy="9144000"/>
@@ -111,15 +113,38 @@
 </p:presentation>
 </file>
 
+<file path=ppt/revisionInfo.xml><?xml version="1.0" encoding="utf-8"?>
+<p1510:revInfo xmlns:a="http://schemas.openxmlformats.org/drawingml/2006/main" xmlns:r="http://schemas.openxmlformats.org/officeDocument/2006/relationships" xmlns:p1510="http://schemas.microsoft.com/office/powerpoint/2015/10/main">
+  <p1510:revLst>
+    <p1510:client id="{EA46388E-06E0-461B-AC3B-0A927C07D937}" v="6" dt="2021-01-02T13:51:37.794"/>
+  </p1510:revLst>
+</p1510:revInfo>
+</file>
+
 <file path=ppt/changesInfos/changesInfo1.xml><?xml version="1.0" encoding="utf-8"?>
 <pc:chgInfo xmlns:a="http://schemas.openxmlformats.org/drawingml/2006/main" xmlns:r="http://schemas.openxmlformats.org/officeDocument/2006/relationships" xmlns:ac="http://schemas.microsoft.com/office/drawing/2013/main/command" xmlns:pc="http://schemas.microsoft.com/office/powerpoint/2013/main/command">
   <pc:docChgLst>
     <pc:chgData name="JOSEPH LEE" userId="a44f2c12-3c6b-4dcf-9734-cf21ba793b98" providerId="ADAL" clId="{EA46388E-06E0-461B-AC3B-0A927C07D937}"/>
     <pc:docChg chg="custSel addSld modSld">
-      <pc:chgData name="JOSEPH LEE" userId="a44f2c12-3c6b-4dcf-9734-cf21ba793b98" providerId="ADAL" clId="{EA46388E-06E0-461B-AC3B-0A927C07D937}" dt="2020-12-30T21:51:04.378" v="11" actId="22"/>
+      <pc:chgData name="JOSEPH LEE" userId="a44f2c12-3c6b-4dcf-9734-cf21ba793b98" providerId="ADAL" clId="{EA46388E-06E0-461B-AC3B-0A927C07D937}" dt="2021-01-02T16:10:08.880" v="74" actId="478"/>
       <pc:docMkLst>
         <pc:docMk/>
       </pc:docMkLst>
+      <pc:sldChg chg="delSp mod">
+        <pc:chgData name="JOSEPH LEE" userId="a44f2c12-3c6b-4dcf-9734-cf21ba793b98" providerId="ADAL" clId="{EA46388E-06E0-461B-AC3B-0A927C07D937}" dt="2021-01-02T16:10:08.880" v="74" actId="478"/>
+        <pc:sldMkLst>
+          <pc:docMk/>
+          <pc:sldMk cId="1576029828" sldId="256"/>
+        </pc:sldMkLst>
+        <pc:spChg chg="del">
+          <ac:chgData name="JOSEPH LEE" userId="a44f2c12-3c6b-4dcf-9734-cf21ba793b98" providerId="ADAL" clId="{EA46388E-06E0-461B-AC3B-0A927C07D937}" dt="2021-01-02T16:10:08.880" v="74" actId="478"/>
+          <ac:spMkLst>
+            <pc:docMk/>
+            <pc:sldMk cId="1576029828" sldId="256"/>
+            <ac:spMk id="6" creationId="{748D6087-BA74-46A1-98A4-A67C0D6E66DC}"/>
+          </ac:spMkLst>
+        </pc:spChg>
+      </pc:sldChg>
       <pc:sldChg chg="delSp mod">
         <pc:chgData name="JOSEPH LEE" userId="a44f2c12-3c6b-4dcf-9734-cf21ba793b98" providerId="ADAL" clId="{EA46388E-06E0-461B-AC3B-0A927C07D937}" dt="2020-12-30T09:50:52.918" v="5" actId="478"/>
         <pc:sldMkLst>
@@ -220,6 +245,92 @@
             <ac:picMk id="4" creationId="{87D8F82C-D503-4354-87EC-E23C9BBCB39D}"/>
           </ac:picMkLst>
         </pc:picChg>
+      </pc:sldChg>
+      <pc:sldChg chg="addSp delSp modSp add mod">
+        <pc:chgData name="JOSEPH LEE" userId="a44f2c12-3c6b-4dcf-9734-cf21ba793b98" providerId="ADAL" clId="{EA46388E-06E0-461B-AC3B-0A927C07D937}" dt="2021-01-02T14:08:01.798" v="72" actId="1076"/>
+        <pc:sldMkLst>
+          <pc:docMk/>
+          <pc:sldMk cId="1465455981" sldId="261"/>
+        </pc:sldMkLst>
+        <pc:spChg chg="add mod">
+          <ac:chgData name="JOSEPH LEE" userId="a44f2c12-3c6b-4dcf-9734-cf21ba793b98" providerId="ADAL" clId="{EA46388E-06E0-461B-AC3B-0A927C07D937}" dt="2021-01-02T14:08:01.798" v="72" actId="1076"/>
+          <ac:spMkLst>
+            <pc:docMk/>
+            <pc:sldMk cId="1465455981" sldId="261"/>
+            <ac:spMk id="9" creationId="{2EB3F2DD-A301-48F6-9466-B8504A9CC268}"/>
+          </ac:spMkLst>
+        </pc:spChg>
+        <pc:spChg chg="add mod">
+          <ac:chgData name="JOSEPH LEE" userId="a44f2c12-3c6b-4dcf-9734-cf21ba793b98" providerId="ADAL" clId="{EA46388E-06E0-461B-AC3B-0A927C07D937}" dt="2021-01-02T14:07:58.370" v="71" actId="1076"/>
+          <ac:spMkLst>
+            <pc:docMk/>
+            <pc:sldMk cId="1465455981" sldId="261"/>
+            <ac:spMk id="10" creationId="{BCFAC3C5-C903-41B6-B166-EEF0EC57A96F}"/>
+          </ac:spMkLst>
+        </pc:spChg>
+        <pc:graphicFrameChg chg="add del mod">
+          <ac:chgData name="JOSEPH LEE" userId="a44f2c12-3c6b-4dcf-9734-cf21ba793b98" providerId="ADAL" clId="{EA46388E-06E0-461B-AC3B-0A927C07D937}" dt="2021-01-02T13:48:14.109" v="21" actId="478"/>
+          <ac:graphicFrameMkLst>
+            <pc:docMk/>
+            <pc:sldMk cId="1465455981" sldId="261"/>
+            <ac:graphicFrameMk id="4" creationId="{794738DF-9DEC-4D78-9ECA-E9B59D0579C5}"/>
+          </ac:graphicFrameMkLst>
+        </pc:graphicFrameChg>
+        <pc:graphicFrameChg chg="add del mod">
+          <ac:chgData name="JOSEPH LEE" userId="a44f2c12-3c6b-4dcf-9734-cf21ba793b98" providerId="ADAL" clId="{EA46388E-06E0-461B-AC3B-0A927C07D937}" dt="2021-01-02T13:48:15.618" v="22" actId="478"/>
+          <ac:graphicFrameMkLst>
+            <pc:docMk/>
+            <pc:sldMk cId="1465455981" sldId="261"/>
+            <ac:graphicFrameMk id="5" creationId="{B41811D2-D957-4742-9A34-CC81336F2A65}"/>
+          </ac:graphicFrameMkLst>
+        </pc:graphicFrameChg>
+        <pc:picChg chg="del">
+          <ac:chgData name="JOSEPH LEE" userId="a44f2c12-3c6b-4dcf-9734-cf21ba793b98" providerId="ADAL" clId="{EA46388E-06E0-461B-AC3B-0A927C07D937}" dt="2021-01-02T13:28:46.168" v="13" actId="478"/>
+          <ac:picMkLst>
+            <pc:docMk/>
+            <pc:sldMk cId="1465455981" sldId="261"/>
+            <ac:picMk id="3" creationId="{7FBA4EE5-5ADD-4A75-82EC-0423EDA0B5A3}"/>
+          </ac:picMkLst>
+        </pc:picChg>
+        <pc:picChg chg="add mod">
+          <ac:chgData name="JOSEPH LEE" userId="a44f2c12-3c6b-4dcf-9734-cf21ba793b98" providerId="ADAL" clId="{EA46388E-06E0-461B-AC3B-0A927C07D937}" dt="2021-01-02T14:06:08.358" v="68" actId="1076"/>
+          <ac:picMkLst>
+            <pc:docMk/>
+            <pc:sldMk cId="1465455981" sldId="261"/>
+            <ac:picMk id="6" creationId="{7DED04F9-2F35-417D-A2F4-3D2D2540C689}"/>
+          </ac:picMkLst>
+        </pc:picChg>
+        <pc:picChg chg="add mod">
+          <ac:chgData name="JOSEPH LEE" userId="a44f2c12-3c6b-4dcf-9734-cf21ba793b98" providerId="ADAL" clId="{EA46388E-06E0-461B-AC3B-0A927C07D937}" dt="2021-01-02T14:07:53.765" v="70" actId="1076"/>
+          <ac:picMkLst>
+            <pc:docMk/>
+            <pc:sldMk cId="1465455981" sldId="261"/>
+            <ac:picMk id="8" creationId="{8ADD9711-068F-4EF5-A2C8-256E66F1B03F}"/>
+          </ac:picMkLst>
+        </pc:picChg>
+        <pc:picChg chg="add mod">
+          <ac:chgData name="JOSEPH LEE" userId="a44f2c12-3c6b-4dcf-9734-cf21ba793b98" providerId="ADAL" clId="{EA46388E-06E0-461B-AC3B-0A927C07D937}" dt="2021-01-02T14:03:37.127" v="64" actId="1076"/>
+          <ac:picMkLst>
+            <pc:docMk/>
+            <pc:sldMk cId="1465455981" sldId="261"/>
+            <ac:picMk id="12" creationId="{9F41CBC0-73CF-4956-82FC-B40AE16F6C06}"/>
+          </ac:picMkLst>
+        </pc:picChg>
+        <pc:picChg chg="add mod">
+          <ac:chgData name="JOSEPH LEE" userId="a44f2c12-3c6b-4dcf-9734-cf21ba793b98" providerId="ADAL" clId="{EA46388E-06E0-461B-AC3B-0A927C07D937}" dt="2021-01-02T14:06:05.756" v="67" actId="14100"/>
+          <ac:picMkLst>
+            <pc:docMk/>
+            <pc:sldMk cId="1465455981" sldId="261"/>
+            <ac:picMk id="14" creationId="{EEBC362E-34DD-4824-BE42-CC59CB81364A}"/>
+          </ac:picMkLst>
+        </pc:picChg>
+      </pc:sldChg>
+      <pc:sldChg chg="add">
+        <pc:chgData name="JOSEPH LEE" userId="a44f2c12-3c6b-4dcf-9734-cf21ba793b98" providerId="ADAL" clId="{EA46388E-06E0-461B-AC3B-0A927C07D937}" dt="2021-01-02T16:10:06.240" v="73" actId="2890"/>
+        <pc:sldMkLst>
+          <pc:docMk/>
+          <pc:sldMk cId="32420978" sldId="262"/>
+        </pc:sldMkLst>
       </pc:sldChg>
     </pc:docChg>
   </pc:docChgLst>
@@ -3491,6 +3602,66 @@
           </a:prstGeom>
         </p:spPr>
       </p:pic>
+    </p:spTree>
+    <p:extLst>
+      <p:ext uri="{BB962C8B-B14F-4D97-AF65-F5344CB8AC3E}">
+        <p14:creationId xmlns:p14="http://schemas.microsoft.com/office/powerpoint/2010/main" val="1576029828"/>
+      </p:ext>
+    </p:extLst>
+  </p:cSld>
+  <p:clrMapOvr>
+    <a:masterClrMapping/>
+  </p:clrMapOvr>
+</p:sld>
+</file>
+
+<file path=ppt/slides/slide2.xml><?xml version="1.0" encoding="utf-8"?>
+<p:sld xmlns:a="http://schemas.openxmlformats.org/drawingml/2006/main" xmlns:r="http://schemas.openxmlformats.org/officeDocument/2006/relationships" xmlns:p="http://schemas.openxmlformats.org/presentationml/2006/main">
+  <p:cSld>
+    <p:spTree>
+      <p:nvGrpSpPr>
+        <p:cNvPr id="1" name=""/>
+        <p:cNvGrpSpPr/>
+        <p:nvPr/>
+      </p:nvGrpSpPr>
+      <p:grpSpPr>
+        <a:xfrm>
+          <a:off x="0" y="0"/>
+          <a:ext cx="0" cy="0"/>
+          <a:chOff x="0" y="0"/>
+          <a:chExt cx="0" cy="0"/>
+        </a:xfrm>
+      </p:grpSpPr>
+      <p:pic>
+        <p:nvPicPr>
+          <p:cNvPr id="5" name="Picture 4">
+            <a:extLst>
+              <a:ext uri="{FF2B5EF4-FFF2-40B4-BE49-F238E27FC236}">
+                <a16:creationId xmlns:a16="http://schemas.microsoft.com/office/drawing/2014/main" id="{7089A1EC-606F-4F85-8FA9-6660E2B9C130}"/>
+              </a:ext>
+            </a:extLst>
+          </p:cNvPr>
+          <p:cNvPicPr>
+            <a:picLocks noChangeAspect="1"/>
+          </p:cNvPicPr>
+          <p:nvPr/>
+        </p:nvPicPr>
+        <p:blipFill>
+          <a:blip r:embed="rId2"/>
+          <a:stretch>
+            <a:fillRect/>
+          </a:stretch>
+        </p:blipFill>
+        <p:spPr>
+          <a:xfrm>
+            <a:off x="1707503" y="215689"/>
+            <a:ext cx="8069910" cy="5908886"/>
+          </a:xfrm>
+          <a:prstGeom prst="rect">
+            <a:avLst/>
+          </a:prstGeom>
+        </p:spPr>
+      </p:pic>
       <p:sp>
         <p:nvSpPr>
           <p:cNvPr id="6" name="Rectangle 5">
@@ -3546,7 +3717,7 @@
     </p:spTree>
     <p:extLst>
       <p:ext uri="{BB962C8B-B14F-4D97-AF65-F5344CB8AC3E}">
-        <p14:creationId xmlns:p14="http://schemas.microsoft.com/office/powerpoint/2010/main" val="1576029828"/>
+        <p14:creationId xmlns:p14="http://schemas.microsoft.com/office/powerpoint/2010/main" val="32420978"/>
       </p:ext>
     </p:extLst>
   </p:cSld>
@@ -3556,7 +3727,7 @@
 </p:sld>
 </file>
 
-<file path=ppt/slides/slide2.xml><?xml version="1.0" encoding="utf-8"?>
+<file path=ppt/slides/slide3.xml><?xml version="1.0" encoding="utf-8"?>
 <p:sld xmlns:a="http://schemas.openxmlformats.org/drawingml/2006/main" xmlns:r="http://schemas.openxmlformats.org/officeDocument/2006/relationships" xmlns:p="http://schemas.openxmlformats.org/presentationml/2006/main">
   <p:cSld>
     <p:spTree>
@@ -3616,7 +3787,7 @@
 </p:sld>
 </file>
 
-<file path=ppt/slides/slide3.xml><?xml version="1.0" encoding="utf-8"?>
+<file path=ppt/slides/slide4.xml><?xml version="1.0" encoding="utf-8"?>
 <p:sld xmlns:a="http://schemas.openxmlformats.org/drawingml/2006/main" xmlns:r="http://schemas.openxmlformats.org/officeDocument/2006/relationships" xmlns:p="http://schemas.openxmlformats.org/presentationml/2006/main">
   <p:cSld>
     <p:spTree>
@@ -3676,7 +3847,7 @@
 </p:sld>
 </file>
 
-<file path=ppt/slides/slide4.xml><?xml version="1.0" encoding="utf-8"?>
+<file path=ppt/slides/slide5.xml><?xml version="1.0" encoding="utf-8"?>
 <p:sld xmlns:a="http://schemas.openxmlformats.org/drawingml/2006/main" xmlns:r="http://schemas.openxmlformats.org/officeDocument/2006/relationships" xmlns:p="http://schemas.openxmlformats.org/presentationml/2006/main">
   <p:cSld>
     <p:spTree>
@@ -3736,7 +3907,7 @@
 </p:sld>
 </file>
 
-<file path=ppt/slides/slide5.xml><?xml version="1.0" encoding="utf-8"?>
+<file path=ppt/slides/slide6.xml><?xml version="1.0" encoding="utf-8"?>
 <p:sld xmlns:a="http://schemas.openxmlformats.org/drawingml/2006/main" xmlns:r="http://schemas.openxmlformats.org/officeDocument/2006/relationships" xmlns:p="http://schemas.openxmlformats.org/presentationml/2006/main">
   <p:cSld>
     <p:spTree>
@@ -3787,6 +3958,238 @@
     <p:extLst>
       <p:ext uri="{BB962C8B-B14F-4D97-AF65-F5344CB8AC3E}">
         <p14:creationId xmlns:p14="http://schemas.microsoft.com/office/powerpoint/2010/main" val="2623758735"/>
+      </p:ext>
+    </p:extLst>
+  </p:cSld>
+  <p:clrMapOvr>
+    <a:masterClrMapping/>
+  </p:clrMapOvr>
+</p:sld>
+</file>
+
+<file path=ppt/slides/slide7.xml><?xml version="1.0" encoding="utf-8"?>
+<p:sld xmlns:a="http://schemas.openxmlformats.org/drawingml/2006/main" xmlns:r="http://schemas.openxmlformats.org/officeDocument/2006/relationships" xmlns:p="http://schemas.openxmlformats.org/presentationml/2006/main">
+  <p:cSld>
+    <p:spTree>
+      <p:nvGrpSpPr>
+        <p:cNvPr id="1" name=""/>
+        <p:cNvGrpSpPr/>
+        <p:nvPr/>
+      </p:nvGrpSpPr>
+      <p:grpSpPr>
+        <a:xfrm>
+          <a:off x="0" y="0"/>
+          <a:ext cx="0" cy="0"/>
+          <a:chOff x="0" y="0"/>
+          <a:chExt cx="0" cy="0"/>
+        </a:xfrm>
+      </p:grpSpPr>
+      <p:pic>
+        <p:nvPicPr>
+          <p:cNvPr id="6" name="Picture 5" descr="Chart, box and whisker chart&#10;&#10;Description automatically generated">
+            <a:extLst>
+              <a:ext uri="{FF2B5EF4-FFF2-40B4-BE49-F238E27FC236}">
+                <a16:creationId xmlns:a16="http://schemas.microsoft.com/office/drawing/2014/main" id="{7DED04F9-2F35-417D-A2F4-3D2D2540C689}"/>
+              </a:ext>
+            </a:extLst>
+          </p:cNvPr>
+          <p:cNvPicPr>
+            <a:picLocks noChangeAspect="1"/>
+          </p:cNvPicPr>
+          <p:nvPr/>
+        </p:nvPicPr>
+        <p:blipFill>
+          <a:blip r:embed="rId2">
+            <a:extLst>
+              <a:ext uri="{28A0092B-C50C-407E-A947-70E740481C1C}">
+                <a14:useLocalDpi xmlns:a14="http://schemas.microsoft.com/office/drawing/2010/main" val="0"/>
+              </a:ext>
+            </a:extLst>
+          </a:blip>
+          <a:stretch>
+            <a:fillRect/>
+          </a:stretch>
+        </p:blipFill>
+        <p:spPr>
+          <a:xfrm>
+            <a:off x="349908" y="1608127"/>
+            <a:ext cx="5239522" cy="3977648"/>
+          </a:xfrm>
+          <a:prstGeom prst="rect">
+            <a:avLst/>
+          </a:prstGeom>
+        </p:spPr>
+      </p:pic>
+      <p:pic>
+        <p:nvPicPr>
+          <p:cNvPr id="8" name="Picture 7" descr="Chart, box and whisker chart&#10;&#10;Description automatically generated">
+            <a:extLst>
+              <a:ext uri="{FF2B5EF4-FFF2-40B4-BE49-F238E27FC236}">
+                <a16:creationId xmlns:a16="http://schemas.microsoft.com/office/drawing/2014/main" id="{8ADD9711-068F-4EF5-A2C8-256E66F1B03F}"/>
+              </a:ext>
+            </a:extLst>
+          </p:cNvPr>
+          <p:cNvPicPr>
+            <a:picLocks noChangeAspect="1"/>
+          </p:cNvPicPr>
+          <p:nvPr/>
+        </p:nvPicPr>
+        <p:blipFill>
+          <a:blip r:embed="rId3">
+            <a:extLst>
+              <a:ext uri="{28A0092B-C50C-407E-A947-70E740481C1C}">
+                <a14:useLocalDpi xmlns:a14="http://schemas.microsoft.com/office/drawing/2010/main" val="0"/>
+              </a:ext>
+            </a:extLst>
+          </a:blip>
+          <a:stretch>
+            <a:fillRect/>
+          </a:stretch>
+        </p:blipFill>
+        <p:spPr>
+          <a:xfrm>
+            <a:off x="6287173" y="1608127"/>
+            <a:ext cx="5239522" cy="3977648"/>
+          </a:xfrm>
+          <a:prstGeom prst="rect">
+            <a:avLst/>
+          </a:prstGeom>
+        </p:spPr>
+      </p:pic>
+      <p:sp>
+        <p:nvSpPr>
+          <p:cNvPr id="9" name="TextBox 8">
+            <a:extLst>
+              <a:ext uri="{FF2B5EF4-FFF2-40B4-BE49-F238E27FC236}">
+                <a16:creationId xmlns:a16="http://schemas.microsoft.com/office/drawing/2014/main" id="{2EB3F2DD-A301-48F6-9466-B8504A9CC268}"/>
+              </a:ext>
+            </a:extLst>
+          </p:cNvPr>
+          <p:cNvSpPr txBox="1"/>
+          <p:nvPr/>
+        </p:nvSpPr>
+        <p:spPr>
+          <a:xfrm>
+            <a:off x="1961479" y="5692292"/>
+            <a:ext cx="2002471" cy="369332"/>
+          </a:xfrm>
+          <a:prstGeom prst="rect">
+            <a:avLst/>
+          </a:prstGeom>
+          <a:noFill/>
+        </p:spPr>
+        <p:txBody>
+          <a:bodyPr wrap="none" rtlCol="0">
+            <a:spAutoFit/>
+          </a:bodyPr>
+          <a:lstStyle/>
+          <a:p>
+            <a:r>
+              <a:rPr lang="en-GB" dirty="0"/>
+              <a:t>Median = 0.000710</a:t>
+            </a:r>
+          </a:p>
+        </p:txBody>
+      </p:sp>
+      <p:sp>
+        <p:nvSpPr>
+          <p:cNvPr id="10" name="TextBox 9">
+            <a:extLst>
+              <a:ext uri="{FF2B5EF4-FFF2-40B4-BE49-F238E27FC236}">
+                <a16:creationId xmlns:a16="http://schemas.microsoft.com/office/drawing/2014/main" id="{BCFAC3C5-C903-41B6-B166-EEF0EC57A96F}"/>
+              </a:ext>
+            </a:extLst>
+          </p:cNvPr>
+          <p:cNvSpPr txBox="1"/>
+          <p:nvPr/>
+        </p:nvSpPr>
+        <p:spPr>
+          <a:xfrm>
+            <a:off x="8321853" y="5692292"/>
+            <a:ext cx="2002471" cy="369332"/>
+          </a:xfrm>
+          <a:prstGeom prst="rect">
+            <a:avLst/>
+          </a:prstGeom>
+          <a:noFill/>
+        </p:spPr>
+        <p:txBody>
+          <a:bodyPr wrap="none" rtlCol="0">
+            <a:spAutoFit/>
+          </a:bodyPr>
+          <a:lstStyle/>
+          <a:p>
+            <a:r>
+              <a:rPr lang="en-GB" dirty="0"/>
+              <a:t>Median = 0.000831</a:t>
+            </a:r>
+          </a:p>
+        </p:txBody>
+      </p:sp>
+      <p:pic>
+        <p:nvPicPr>
+          <p:cNvPr id="12" name="Picture 11">
+            <a:extLst>
+              <a:ext uri="{FF2B5EF4-FFF2-40B4-BE49-F238E27FC236}">
+                <a16:creationId xmlns:a16="http://schemas.microsoft.com/office/drawing/2014/main" id="{9F41CBC0-73CF-4956-82FC-B40AE16F6C06}"/>
+              </a:ext>
+            </a:extLst>
+          </p:cNvPr>
+          <p:cNvPicPr>
+            <a:picLocks noChangeAspect="1"/>
+          </p:cNvPicPr>
+          <p:nvPr/>
+        </p:nvPicPr>
+        <p:blipFill>
+          <a:blip r:embed="rId4"/>
+          <a:stretch>
+            <a:fillRect/>
+          </a:stretch>
+        </p:blipFill>
+        <p:spPr>
+          <a:xfrm>
+            <a:off x="6804087" y="53458"/>
+            <a:ext cx="5038005" cy="1218767"/>
+          </a:xfrm>
+          <a:prstGeom prst="rect">
+            <a:avLst/>
+          </a:prstGeom>
+        </p:spPr>
+      </p:pic>
+      <p:pic>
+        <p:nvPicPr>
+          <p:cNvPr id="14" name="Picture 13">
+            <a:extLst>
+              <a:ext uri="{FF2B5EF4-FFF2-40B4-BE49-F238E27FC236}">
+                <a16:creationId xmlns:a16="http://schemas.microsoft.com/office/drawing/2014/main" id="{EEBC362E-34DD-4824-BE42-CC59CB81364A}"/>
+              </a:ext>
+            </a:extLst>
+          </p:cNvPr>
+          <p:cNvPicPr>
+            <a:picLocks noChangeAspect="1"/>
+          </p:cNvPicPr>
+          <p:nvPr/>
+        </p:nvPicPr>
+        <p:blipFill>
+          <a:blip r:embed="rId5"/>
+          <a:stretch>
+            <a:fillRect/>
+          </a:stretch>
+        </p:blipFill>
+        <p:spPr>
+          <a:xfrm>
+            <a:off x="247120" y="-15280"/>
+            <a:ext cx="5431191" cy="1405224"/>
+          </a:xfrm>
+          <a:prstGeom prst="rect">
+            <a:avLst/>
+          </a:prstGeom>
+        </p:spPr>
+      </p:pic>
+    </p:spTree>
+    <p:extLst>
+      <p:ext uri="{BB962C8B-B14F-4D97-AF65-F5344CB8AC3E}">
+        <p14:creationId xmlns:p14="http://schemas.microsoft.com/office/powerpoint/2010/main" val="1465455981"/>
       </p:ext>
     </p:extLst>
   </p:cSld>

</xml_diff>